<commit_message>
Play button Bug Fixed
</commit_message>
<xml_diff>
--- a/MVVM Migration.pptx
+++ b/MVVM Migration.pptx
@@ -204,7 +204,7 @@
           <a:p>
             <a:fld id="{1E113264-B70D-BA40-AFB9-ED53677AC052}" type="datetimeFigureOut">
               <a:rPr kumimoji="1" lang="ko-KR" altLang="en-US" smtClean="0"/>
-              <a:t>2019. 4. 5.</a:t>
+              <a:t>2019. 4. 10.</a:t>
             </a:fld>
             <a:endParaRPr kumimoji="1" lang="ko-KR" altLang="en-US"/>
           </a:p>
@@ -602,7 +602,7 @@
           <a:p>
             <a:fld id="{88AA6F09-31A1-BB45-AA6F-51DDBF1E2F2F}" type="datetimeFigureOut">
               <a:rPr kumimoji="1" lang="ko-KR" altLang="en-US" smtClean="0"/>
-              <a:t>2019. 4. 5.</a:t>
+              <a:t>2019. 4. 10.</a:t>
             </a:fld>
             <a:endParaRPr kumimoji="1" lang="ko-KR" altLang="en-US"/>
           </a:p>
@@ -748,7 +748,7 @@
           <a:p>
             <a:fld id="{88AA6F09-31A1-BB45-AA6F-51DDBF1E2F2F}" type="datetimeFigureOut">
               <a:rPr kumimoji="1" lang="ko-KR" altLang="en-US" smtClean="0"/>
-              <a:t>2019. 4. 5.</a:t>
+              <a:t>2019. 4. 10.</a:t>
             </a:fld>
             <a:endParaRPr kumimoji="1" lang="ko-KR" altLang="en-US"/>
           </a:p>
@@ -904,7 +904,7 @@
           <a:p>
             <a:fld id="{88AA6F09-31A1-BB45-AA6F-51DDBF1E2F2F}" type="datetimeFigureOut">
               <a:rPr kumimoji="1" lang="ko-KR" altLang="en-US" smtClean="0"/>
-              <a:t>2019. 4. 5.</a:t>
+              <a:t>2019. 4. 10.</a:t>
             </a:fld>
             <a:endParaRPr kumimoji="1" lang="ko-KR" altLang="en-US"/>
           </a:p>
@@ -1050,7 +1050,7 @@
           <a:p>
             <a:fld id="{88AA6F09-31A1-BB45-AA6F-51DDBF1E2F2F}" type="datetimeFigureOut">
               <a:rPr kumimoji="1" lang="ko-KR" altLang="en-US" smtClean="0"/>
-              <a:t>2019. 4. 5.</a:t>
+              <a:t>2019. 4. 10.</a:t>
             </a:fld>
             <a:endParaRPr kumimoji="1" lang="ko-KR" altLang="en-US"/>
           </a:p>
@@ -1299,7 +1299,7 @@
           <a:p>
             <a:fld id="{88AA6F09-31A1-BB45-AA6F-51DDBF1E2F2F}" type="datetimeFigureOut">
               <a:rPr kumimoji="1" lang="ko-KR" altLang="en-US" smtClean="0"/>
-              <a:t>2019. 4. 5.</a:t>
+              <a:t>2019. 4. 10.</a:t>
             </a:fld>
             <a:endParaRPr kumimoji="1" lang="ko-KR" altLang="en-US"/>
           </a:p>
@@ -1483,7 +1483,7 @@
           <a:p>
             <a:fld id="{88AA6F09-31A1-BB45-AA6F-51DDBF1E2F2F}" type="datetimeFigureOut">
               <a:rPr kumimoji="1" lang="ko-KR" altLang="en-US" smtClean="0"/>
-              <a:t>2019. 4. 5.</a:t>
+              <a:t>2019. 4. 10.</a:t>
             </a:fld>
             <a:endParaRPr kumimoji="1" lang="ko-KR" altLang="en-US"/>
           </a:p>
@@ -1812,7 +1812,7 @@
           <a:p>
             <a:fld id="{88AA6F09-31A1-BB45-AA6F-51DDBF1E2F2F}" type="datetimeFigureOut">
               <a:rPr kumimoji="1" lang="ko-KR" altLang="en-US" smtClean="0"/>
-              <a:t>2019. 4. 5.</a:t>
+              <a:t>2019. 4. 10.</a:t>
             </a:fld>
             <a:endParaRPr kumimoji="1" lang="ko-KR" altLang="en-US"/>
           </a:p>
@@ -1930,7 +1930,7 @@
           <a:p>
             <a:fld id="{88AA6F09-31A1-BB45-AA6F-51DDBF1E2F2F}" type="datetimeFigureOut">
               <a:rPr kumimoji="1" lang="ko-KR" altLang="en-US" smtClean="0"/>
-              <a:t>2019. 4. 5.</a:t>
+              <a:t>2019. 4. 10.</a:t>
             </a:fld>
             <a:endParaRPr kumimoji="1" lang="ko-KR" altLang="en-US"/>
           </a:p>
@@ -2025,7 +2025,7 @@
           <a:p>
             <a:fld id="{88AA6F09-31A1-BB45-AA6F-51DDBF1E2F2F}" type="datetimeFigureOut">
               <a:rPr kumimoji="1" lang="ko-KR" altLang="en-US" smtClean="0"/>
-              <a:t>2019. 4. 5.</a:t>
+              <a:t>2019. 4. 10.</a:t>
             </a:fld>
             <a:endParaRPr kumimoji="1" lang="ko-KR" altLang="en-US"/>
           </a:p>
@@ -2283,7 +2283,7 @@
           <a:p>
             <a:fld id="{88AA6F09-31A1-BB45-AA6F-51DDBF1E2F2F}" type="datetimeFigureOut">
               <a:rPr kumimoji="1" lang="ko-KR" altLang="en-US" smtClean="0"/>
-              <a:t>2019. 4. 5.</a:t>
+              <a:t>2019. 4. 10.</a:t>
             </a:fld>
             <a:endParaRPr kumimoji="1" lang="ko-KR" altLang="en-US"/>
           </a:p>
@@ -2545,7 +2545,7 @@
           <a:p>
             <a:fld id="{88AA6F09-31A1-BB45-AA6F-51DDBF1E2F2F}" type="datetimeFigureOut">
               <a:rPr kumimoji="1" lang="ko-KR" altLang="en-US" smtClean="0"/>
-              <a:t>2019. 4. 5.</a:t>
+              <a:t>2019. 4. 10.</a:t>
             </a:fld>
             <a:endParaRPr kumimoji="1" lang="ko-KR" altLang="en-US"/>
           </a:p>
@@ -2734,7 +2734,7 @@
           <a:p>
             <a:fld id="{88AA6F09-31A1-BB45-AA6F-51DDBF1E2F2F}" type="datetimeFigureOut">
               <a:rPr kumimoji="1" lang="ko-KR" altLang="en-US" smtClean="0"/>
-              <a:t>2019. 4. 5.</a:t>
+              <a:t>2019. 4. 10.</a:t>
             </a:fld>
             <a:endParaRPr kumimoji="1" lang="ko-KR" altLang="en-US"/>
           </a:p>

</xml_diff>